<commit_message>
updated the presentation, algorithm had wrong indentation
</commit_message>
<xml_diff>
--- a/Presentation1.pptx
+++ b/Presentation1.pptx
@@ -9395,17 +9395,17 @@
               <a:tabLst/>
             </a:pPr>
             <a:r>
-              <a:rPr lang="en-US" altLang="en-US" sz="1000" dirty="0">
+              <a:rPr lang="en-US" altLang="en-US" sz="1000">
                 <a:solidFill>
                   <a:srgbClr val="000000"/>
                 </a:solidFill>
                 <a:latin typeface="Courier New" panose="02070309020205020404" pitchFamily="49" charset="0"/>
                 <a:cs typeface="Courier New" panose="02070309020205020404" pitchFamily="49" charset="0"/>
               </a:rPr>
-              <a:t>            </a:t>
-            </a:r>
-            <a:r>
-              <a:rPr kumimoji="0" lang="en-US" altLang="en-US" sz="1000" b="1" i="0" u="none" strike="noStrike" cap="none" normalizeH="0" baseline="0" dirty="0">
+              <a:t>                </a:t>
+            </a:r>
+            <a:r>
+              <a:rPr kumimoji="0" lang="en-US" altLang="en-US" sz="1000" b="1" i="0" u="none" strike="noStrike" cap="none" normalizeH="0" baseline="0">
                 <a:ln>
                   <a:noFill/>
                 </a:ln>
@@ -9418,6 +9418,17 @@
               </a:rPr>
               <a:t>break</a:t>
             </a:r>
+            <a:endParaRPr kumimoji="0" lang="en-US" altLang="en-US" sz="1000" b="1" i="0" u="none" strike="noStrike" cap="none" normalizeH="0" baseline="0" dirty="0">
+              <a:ln>
+                <a:noFill/>
+              </a:ln>
+              <a:solidFill>
+                <a:srgbClr val="000000"/>
+              </a:solidFill>
+              <a:effectLst/>
+              <a:latin typeface="Courier New" panose="02070309020205020404" pitchFamily="49" charset="0"/>
+              <a:cs typeface="Courier New" panose="02070309020205020404" pitchFamily="49" charset="0"/>
+            </a:endParaRPr>
           </a:p>
           <a:p>
             <a:pPr marL="0" marR="0" lvl="0" indent="0" algn="l" defTabSz="914400" rtl="0" eaLnBrk="0" fontAlgn="base" latinLnBrk="0" hangingPunct="0">

</xml_diff>

<commit_message>
Incorporated review comments from Tanel
</commit_message>
<xml_diff>
--- a/Presentation1.pptx
+++ b/Presentation1.pptx
@@ -325,7 +325,7 @@
           <a:p>
             <a:fld id="{43B962C8-492A-48BE-A39A-F382F06F9D47}" type="datetimeFigureOut">
               <a:rPr lang="en-US" smtClean="0"/>
-              <a:t>8/17/2018</a:t>
+              <a:t>8/27/2018</a:t>
             </a:fld>
             <a:endParaRPr lang="en-US"/>
           </a:p>
@@ -663,7 +663,7 @@
           <a:p>
             <a:fld id="{43B962C8-492A-48BE-A39A-F382F06F9D47}" type="datetimeFigureOut">
               <a:rPr lang="en-US" smtClean="0"/>
-              <a:t>8/17/2018</a:t>
+              <a:t>8/27/2018</a:t>
             </a:fld>
             <a:endParaRPr lang="en-US"/>
           </a:p>
@@ -1064,7 +1064,7 @@
           <a:p>
             <a:fld id="{43B962C8-492A-48BE-A39A-F382F06F9D47}" type="datetimeFigureOut">
               <a:rPr lang="en-US" smtClean="0"/>
-              <a:t>8/17/2018</a:t>
+              <a:t>8/27/2018</a:t>
             </a:fld>
             <a:endParaRPr lang="en-US"/>
           </a:p>
@@ -1400,7 +1400,7 @@
           <a:p>
             <a:fld id="{43B962C8-492A-48BE-A39A-F382F06F9D47}" type="datetimeFigureOut">
               <a:rPr lang="en-US" smtClean="0"/>
-              <a:t>8/17/2018</a:t>
+              <a:t>8/27/2018</a:t>
             </a:fld>
             <a:endParaRPr lang="en-US"/>
           </a:p>
@@ -1720,7 +1720,7 @@
           <a:p>
             <a:fld id="{43B962C8-492A-48BE-A39A-F382F06F9D47}" type="datetimeFigureOut">
               <a:rPr lang="en-US" smtClean="0"/>
-              <a:t>8/17/2018</a:t>
+              <a:t>8/27/2018</a:t>
             </a:fld>
             <a:endParaRPr lang="en-US"/>
           </a:p>
@@ -2116,7 +2116,7 @@
           <a:p>
             <a:fld id="{43B962C8-492A-48BE-A39A-F382F06F9D47}" type="datetimeFigureOut">
               <a:rPr lang="en-US" smtClean="0"/>
-              <a:t>8/17/2018</a:t>
+              <a:t>8/27/2018</a:t>
             </a:fld>
             <a:endParaRPr lang="en-US"/>
           </a:p>
@@ -2373,7 +2373,7 @@
           <a:p>
             <a:fld id="{43B962C8-492A-48BE-A39A-F382F06F9D47}" type="datetimeFigureOut">
               <a:rPr lang="en-US" smtClean="0"/>
-              <a:t>8/17/2018</a:t>
+              <a:t>8/27/2018</a:t>
             </a:fld>
             <a:endParaRPr lang="en-US"/>
           </a:p>
@@ -2635,7 +2635,7 @@
           <a:p>
             <a:fld id="{43B962C8-492A-48BE-A39A-F382F06F9D47}" type="datetimeFigureOut">
               <a:rPr lang="en-US" smtClean="0"/>
-              <a:t>8/17/2018</a:t>
+              <a:t>8/27/2018</a:t>
             </a:fld>
             <a:endParaRPr lang="en-US"/>
           </a:p>
@@ -2897,7 +2897,7 @@
           <a:p>
             <a:fld id="{43B962C8-492A-48BE-A39A-F382F06F9D47}" type="datetimeFigureOut">
               <a:rPr lang="en-US" smtClean="0"/>
-              <a:t>8/17/2018</a:t>
+              <a:t>8/27/2018</a:t>
             </a:fld>
             <a:endParaRPr lang="en-US"/>
           </a:p>
@@ -3226,7 +3226,7 @@
           <a:p>
             <a:fld id="{43B962C8-492A-48BE-A39A-F382F06F9D47}" type="datetimeFigureOut">
               <a:rPr lang="en-US" smtClean="0"/>
-              <a:t>8/17/2018</a:t>
+              <a:t>8/27/2018</a:t>
             </a:fld>
             <a:endParaRPr lang="en-US"/>
           </a:p>
@@ -3549,7 +3549,7 @@
           <a:p>
             <a:fld id="{43B962C8-492A-48BE-A39A-F382F06F9D47}" type="datetimeFigureOut">
               <a:rPr lang="en-US" smtClean="0"/>
-              <a:t>8/17/2018</a:t>
+              <a:t>8/27/2018</a:t>
             </a:fld>
             <a:endParaRPr lang="en-US"/>
           </a:p>
@@ -4006,7 +4006,7 @@
           <a:p>
             <a:fld id="{43B962C8-492A-48BE-A39A-F382F06F9D47}" type="datetimeFigureOut">
               <a:rPr lang="en-US" smtClean="0"/>
-              <a:t>8/17/2018</a:t>
+              <a:t>8/27/2018</a:t>
             </a:fld>
             <a:endParaRPr lang="en-US"/>
           </a:p>
@@ -4211,7 +4211,7 @@
           <a:p>
             <a:fld id="{43B962C8-492A-48BE-A39A-F382F06F9D47}" type="datetimeFigureOut">
               <a:rPr lang="en-US" smtClean="0"/>
-              <a:t>8/17/2018</a:t>
+              <a:t>8/27/2018</a:t>
             </a:fld>
             <a:endParaRPr lang="en-US"/>
           </a:p>
@@ -4388,7 +4388,7 @@
           <a:p>
             <a:fld id="{43B962C8-492A-48BE-A39A-F382F06F9D47}" type="datetimeFigureOut">
               <a:rPr lang="en-US" smtClean="0"/>
-              <a:t>8/17/2018</a:t>
+              <a:t>8/27/2018</a:t>
             </a:fld>
             <a:endParaRPr lang="en-US"/>
           </a:p>
@@ -4721,7 +4721,7 @@
           <a:p>
             <a:fld id="{43B962C8-492A-48BE-A39A-F382F06F9D47}" type="datetimeFigureOut">
               <a:rPr lang="en-US" smtClean="0"/>
-              <a:t>8/17/2018</a:t>
+              <a:t>8/27/2018</a:t>
             </a:fld>
             <a:endParaRPr lang="en-US"/>
           </a:p>
@@ -5066,7 +5066,7 @@
           <a:p>
             <a:fld id="{43B962C8-492A-48BE-A39A-F382F06F9D47}" type="datetimeFigureOut">
               <a:rPr lang="en-US" smtClean="0"/>
-              <a:t>8/17/2018</a:t>
+              <a:t>8/27/2018</a:t>
             </a:fld>
             <a:endParaRPr lang="en-US"/>
           </a:p>
@@ -7183,7 +7183,7 @@
           <a:p>
             <a:fld id="{43B962C8-492A-48BE-A39A-F382F06F9D47}" type="datetimeFigureOut">
               <a:rPr lang="en-US" smtClean="0"/>
-              <a:t>8/17/2018</a:t>
+              <a:t>8/27/2018</a:t>
             </a:fld>
             <a:endParaRPr lang="en-US"/>
           </a:p>
@@ -9047,10 +9047,9 @@
           <a:lstStyle/>
           <a:p>
             <a:r>
-              <a:rPr lang="en-US"/>
-              <a:t>Outline</a:t>
-            </a:r>
-            <a:endParaRPr lang="en-US" dirty="0"/>
+              <a:rPr lang="en-US" dirty="0"/>
+              <a:t>Background and Topics Covered</a:t>
+            </a:r>
           </a:p>
         </p:txBody>
       </p:sp>
@@ -10918,7 +10917,7 @@
             <a:pPr lvl="1"/>
             <a:r>
               <a:rPr lang="en-US" dirty="0"/>
-              <a:t>Granularity of locking, reduces performance</a:t>
+              <a:t>Not having a fine grained granularity of locking, reduces performance</a:t>
             </a:r>
           </a:p>
           <a:p>
@@ -10932,8 +10931,13 @@
             <a:pPr lvl="2"/>
             <a:r>
               <a:rPr lang="en-US" dirty="0"/>
-              <a:t>Conditions for deadlock</a:t>
-            </a:r>
+              <a:t>Classical conditions for deadlock </a:t>
+            </a:r>
+            <a:r>
+              <a:rPr lang="en-US"/>
+              <a:t>to occur</a:t>
+            </a:r>
+            <a:endParaRPr lang="en-US" dirty="0"/>
           </a:p>
           <a:p>
             <a:pPr lvl="3"/>

</xml_diff>